<commit_message>
Shrink nltk presentation file
</commit_message>
<xml_diff>
--- a/nltk.pptx
+++ b/nltk.pptx
@@ -7851,14 +7851,13 @@
               </a:ext>
             </a:extLst>
           </a:blip>
-          <a:stretch>
-            <a:fillRect/>
-          </a:stretch>
+          <a:srcRect/>
+          <a:stretch/>
         </p:blipFill>
         <p:spPr>
           <a:xfrm>
-            <a:off x="3089429" y="2163568"/>
-            <a:ext cx="2963580" cy="3888656"/>
+            <a:off x="3091099" y="2163568"/>
+            <a:ext cx="2960239" cy="3888656"/>
           </a:xfrm>
           <a:prstGeom prst="rect">
             <a:avLst/>

</xml_diff>